<commit_message>
Elaboration part2 in progress.
</commit_message>
<xml_diff>
--- a/incquery-deps-thesis/visio-diagrams/diagram-source.pptx
+++ b/incquery-deps-thesis/visio-diagrams/diagram-source.pptx
@@ -5,7 +5,7 @@
     <p:sldMasterId id="2147483648" r:id="rId1"/>
   </p:sldMasterIdLst>
   <p:notesMasterIdLst>
-    <p:notesMasterId r:id="rId10"/>
+    <p:notesMasterId r:id="rId11"/>
   </p:notesMasterIdLst>
   <p:sldIdLst>
     <p:sldId id="262" r:id="rId2"/>
@@ -16,6 +16,7 @@
     <p:sldId id="265" r:id="rId7"/>
     <p:sldId id="266" r:id="rId8"/>
     <p:sldId id="267" r:id="rId9"/>
+    <p:sldId id="268" r:id="rId10"/>
   </p:sldIdLst>
   <p:sldSz cx="6858000" cy="9906000" type="A4"/>
   <p:notesSz cx="6858000" cy="9144000"/>
@@ -131,6 +132,7 @@
             <p14:sldId id="265"/>
             <p14:sldId id="266"/>
             <p14:sldId id="267"/>
+            <p14:sldId id="268"/>
           </p14:sldIdLst>
         </p14:section>
       </p14:sectionLst>
@@ -6309,7 +6311,7 @@
           <a:p>
             <a:fld id="{066D07CF-11C7-4B9C-BCBF-E2D9FCA17911}" type="datetimeFigureOut">
               <a:rPr lang="hu-HU" smtClean="0"/>
-              <a:t>2012.10.28.</a:t>
+              <a:t>2012.12.04.</a:t>
             </a:fld>
             <a:endParaRPr lang="hu-HU"/>
           </a:p>
@@ -6852,7 +6854,7 @@
           <a:p>
             <a:fld id="{109A3B03-3B51-4BDD-9DD7-3CEC69C24252}" type="datetimeFigureOut">
               <a:rPr lang="hu-HU" smtClean="0"/>
-              <a:t>2012.10.28.</a:t>
+              <a:t>2012.12.04.</a:t>
             </a:fld>
             <a:endParaRPr lang="hu-HU"/>
           </a:p>
@@ -7022,7 +7024,7 @@
           <a:p>
             <a:fld id="{109A3B03-3B51-4BDD-9DD7-3CEC69C24252}" type="datetimeFigureOut">
               <a:rPr lang="hu-HU" smtClean="0"/>
-              <a:t>2012.10.28.</a:t>
+              <a:t>2012.12.04.</a:t>
             </a:fld>
             <a:endParaRPr lang="hu-HU"/>
           </a:p>
@@ -7202,7 +7204,7 @@
           <a:p>
             <a:fld id="{109A3B03-3B51-4BDD-9DD7-3CEC69C24252}" type="datetimeFigureOut">
               <a:rPr lang="hu-HU" smtClean="0"/>
-              <a:t>2012.10.28.</a:t>
+              <a:t>2012.12.04.</a:t>
             </a:fld>
             <a:endParaRPr lang="hu-HU"/>
           </a:p>
@@ -7372,7 +7374,7 @@
           <a:p>
             <a:fld id="{109A3B03-3B51-4BDD-9DD7-3CEC69C24252}" type="datetimeFigureOut">
               <a:rPr lang="hu-HU" smtClean="0"/>
-              <a:t>2012.10.28.</a:t>
+              <a:t>2012.12.04.</a:t>
             </a:fld>
             <a:endParaRPr lang="hu-HU"/>
           </a:p>
@@ -7618,7 +7620,7 @@
           <a:p>
             <a:fld id="{109A3B03-3B51-4BDD-9DD7-3CEC69C24252}" type="datetimeFigureOut">
               <a:rPr lang="hu-HU" smtClean="0"/>
-              <a:t>2012.10.28.</a:t>
+              <a:t>2012.12.04.</a:t>
             </a:fld>
             <a:endParaRPr lang="hu-HU"/>
           </a:p>
@@ -7906,7 +7908,7 @@
           <a:p>
             <a:fld id="{109A3B03-3B51-4BDD-9DD7-3CEC69C24252}" type="datetimeFigureOut">
               <a:rPr lang="hu-HU" smtClean="0"/>
-              <a:t>2012.10.28.</a:t>
+              <a:t>2012.12.04.</a:t>
             </a:fld>
             <a:endParaRPr lang="hu-HU"/>
           </a:p>
@@ -8328,7 +8330,7 @@
           <a:p>
             <a:fld id="{109A3B03-3B51-4BDD-9DD7-3CEC69C24252}" type="datetimeFigureOut">
               <a:rPr lang="hu-HU" smtClean="0"/>
-              <a:t>2012.10.28.</a:t>
+              <a:t>2012.12.04.</a:t>
             </a:fld>
             <a:endParaRPr lang="hu-HU"/>
           </a:p>
@@ -8446,7 +8448,7 @@
           <a:p>
             <a:fld id="{109A3B03-3B51-4BDD-9DD7-3CEC69C24252}" type="datetimeFigureOut">
               <a:rPr lang="hu-HU" smtClean="0"/>
-              <a:t>2012.10.28.</a:t>
+              <a:t>2012.12.04.</a:t>
             </a:fld>
             <a:endParaRPr lang="hu-HU"/>
           </a:p>
@@ -8541,7 +8543,7 @@
           <a:p>
             <a:fld id="{109A3B03-3B51-4BDD-9DD7-3CEC69C24252}" type="datetimeFigureOut">
               <a:rPr lang="hu-HU" smtClean="0"/>
-              <a:t>2012.10.28.</a:t>
+              <a:t>2012.12.04.</a:t>
             </a:fld>
             <a:endParaRPr lang="hu-HU"/>
           </a:p>
@@ -8818,7 +8820,7 @@
           <a:p>
             <a:fld id="{109A3B03-3B51-4BDD-9DD7-3CEC69C24252}" type="datetimeFigureOut">
               <a:rPr lang="hu-HU" smtClean="0"/>
-              <a:t>2012.10.28.</a:t>
+              <a:t>2012.12.04.</a:t>
             </a:fld>
             <a:endParaRPr lang="hu-HU"/>
           </a:p>
@@ -9071,7 +9073,7 @@
           <a:p>
             <a:fld id="{109A3B03-3B51-4BDD-9DD7-3CEC69C24252}" type="datetimeFigureOut">
               <a:rPr lang="hu-HU" smtClean="0"/>
-              <a:t>2012.10.28.</a:t>
+              <a:t>2012.12.04.</a:t>
             </a:fld>
             <a:endParaRPr lang="hu-HU"/>
           </a:p>
@@ -9284,7 +9286,7 @@
           <a:p>
             <a:fld id="{109A3B03-3B51-4BDD-9DD7-3CEC69C24252}" type="datetimeFigureOut">
               <a:rPr lang="hu-HU" smtClean="0"/>
-              <a:t>2012.10.28.</a:t>
+              <a:t>2012.12.04.</a:t>
             </a:fld>
             <a:endParaRPr lang="hu-HU"/>
           </a:p>
@@ -16236,6 +16238,490 @@
     <p:extLst>
       <p:ext uri="{BB962C8B-B14F-4D97-AF65-F5344CB8AC3E}">
         <p14:creationId xmlns:p14="http://schemas.microsoft.com/office/powerpoint/2010/main" val="3949817856"/>
+      </p:ext>
+    </p:extLst>
+  </p:cSld>
+  <p:clrMapOvr>
+    <a:masterClrMapping/>
+  </p:clrMapOvr>
+</p:sld>
+</file>
+
+<file path=ppt/slides/slide9.xml><?xml version="1.0" encoding="utf-8"?>
+<p:sld xmlns:a="http://schemas.openxmlformats.org/drawingml/2006/main" xmlns:r="http://schemas.openxmlformats.org/officeDocument/2006/relationships" xmlns:p="http://schemas.openxmlformats.org/presentationml/2006/main">
+  <p:cSld>
+    <p:spTree>
+      <p:nvGrpSpPr>
+        <p:cNvPr id="1" name=""/>
+        <p:cNvGrpSpPr/>
+        <p:nvPr/>
+      </p:nvGrpSpPr>
+      <p:grpSpPr>
+        <a:xfrm>
+          <a:off x="0" y="0"/>
+          <a:ext cx="0" cy="0"/>
+          <a:chOff x="0" y="0"/>
+          <a:chExt cx="0" cy="0"/>
+        </a:xfrm>
+      </p:grpSpPr>
+      <p:pic>
+        <p:nvPicPr>
+          <p:cNvPr id="8" name="Picture 2" descr="C:\Users\Donat\Desktop\sim\ObjectDiagram1.png"/>
+          <p:cNvPicPr>
+            <a:picLocks noChangeAspect="1" noChangeArrowheads="1"/>
+          </p:cNvPicPr>
+          <p:nvPr/>
+        </p:nvPicPr>
+        <p:blipFill rotWithShape="1">
+          <a:blip r:embed="rId2">
+            <a:extLst>
+              <a:ext uri="{28A0092B-C50C-407E-A947-70E740481C1C}">
+                <a14:useLocalDpi xmlns:a14="http://schemas.microsoft.com/office/drawing/2010/main" val="0"/>
+              </a:ext>
+            </a:extLst>
+          </a:blip>
+          <a:srcRect l="51539" t="59307" b="14574"/>
+          <a:stretch/>
+        </p:blipFill>
+        <p:spPr bwMode="auto">
+          <a:xfrm>
+            <a:off x="332656" y="5601072"/>
+            <a:ext cx="5958450" cy="2880319"/>
+          </a:xfrm>
+          <a:prstGeom prst="rect">
+            <a:avLst/>
+          </a:prstGeom>
+          <a:extLst>
+            <a:ext uri="{909E8E84-426E-40DD-AFC4-6F175D3DCCD1}">
+              <a14:hiddenFill xmlns:a14="http://schemas.microsoft.com/office/drawing/2010/main">
+                <a:solidFill>
+                  <a:srgbClr val="FFFFFF"/>
+                </a:solidFill>
+              </a14:hiddenFill>
+            </a:ext>
+          </a:extLst>
+        </p:spPr>
+      </p:pic>
+      <p:sp>
+        <p:nvSpPr>
+          <p:cNvPr id="13" name="Rectangle 12"/>
+          <p:cNvSpPr/>
+          <p:nvPr/>
+        </p:nvSpPr>
+        <p:spPr>
+          <a:xfrm>
+            <a:off x="4149080" y="5529064"/>
+            <a:ext cx="2088232" cy="3456384"/>
+          </a:xfrm>
+          <a:prstGeom prst="rect">
+            <a:avLst/>
+          </a:prstGeom>
+          <a:noFill/>
+        </p:spPr>
+        <p:style>
+          <a:lnRef idx="2">
+            <a:schemeClr val="dk1"/>
+          </a:lnRef>
+          <a:fillRef idx="1">
+            <a:schemeClr val="lt1"/>
+          </a:fillRef>
+          <a:effectRef idx="0">
+            <a:schemeClr val="dk1"/>
+          </a:effectRef>
+          <a:fontRef idx="minor">
+            <a:schemeClr val="dk1"/>
+          </a:fontRef>
+        </p:style>
+        <p:txBody>
+          <a:bodyPr rtlCol="0" anchor="ctr"/>
+          <a:lstStyle/>
+          <a:p>
+            <a:pPr algn="ctr"/>
+            <a:endParaRPr lang="en-US"/>
+          </a:p>
+        </p:txBody>
+      </p:sp>
+      <p:sp>
+        <p:nvSpPr>
+          <p:cNvPr id="14" name="Rectangle 13"/>
+          <p:cNvSpPr/>
+          <p:nvPr/>
+        </p:nvSpPr>
+        <p:spPr>
+          <a:xfrm>
+            <a:off x="332656" y="5529064"/>
+            <a:ext cx="3744416" cy="3456384"/>
+          </a:xfrm>
+          <a:prstGeom prst="rect">
+            <a:avLst/>
+          </a:prstGeom>
+          <a:noFill/>
+        </p:spPr>
+        <p:style>
+          <a:lnRef idx="2">
+            <a:schemeClr val="dk1"/>
+          </a:lnRef>
+          <a:fillRef idx="1">
+            <a:schemeClr val="lt1"/>
+          </a:fillRef>
+          <a:effectRef idx="0">
+            <a:schemeClr val="dk1"/>
+          </a:effectRef>
+          <a:fontRef idx="minor">
+            <a:schemeClr val="dk1"/>
+          </a:fontRef>
+        </p:style>
+        <p:txBody>
+          <a:bodyPr rtlCol="0" anchor="ctr"/>
+          <a:lstStyle/>
+          <a:p>
+            <a:pPr algn="ctr"/>
+            <a:endParaRPr lang="en-US"/>
+          </a:p>
+        </p:txBody>
+      </p:sp>
+      <p:sp>
+        <p:nvSpPr>
+          <p:cNvPr id="15" name="TextBox 14"/>
+          <p:cNvSpPr txBox="1"/>
+          <p:nvPr/>
+        </p:nvSpPr>
+        <p:spPr>
+          <a:xfrm>
+            <a:off x="5006712" y="8616116"/>
+            <a:ext cx="1226780" cy="369332"/>
+          </a:xfrm>
+          <a:prstGeom prst="rect">
+            <a:avLst/>
+          </a:prstGeom>
+          <a:noFill/>
+        </p:spPr>
+        <p:txBody>
+          <a:bodyPr wrap="square" rtlCol="0">
+            <a:spAutoFit/>
+          </a:bodyPr>
+          <a:lstStyle/>
+          <a:p>
+            <a:r>
+              <a:rPr lang="hu-HU" dirty="0" smtClean="0"/>
+              <a:t>Workspace</a:t>
+            </a:r>
+            <a:endParaRPr lang="en-US" dirty="0"/>
+          </a:p>
+        </p:txBody>
+      </p:sp>
+      <p:sp>
+        <p:nvSpPr>
+          <p:cNvPr id="16" name="TextBox 15"/>
+          <p:cNvSpPr txBox="1"/>
+          <p:nvPr/>
+        </p:nvSpPr>
+        <p:spPr>
+          <a:xfrm>
+            <a:off x="2853318" y="8616116"/>
+            <a:ext cx="1226780" cy="369332"/>
+          </a:xfrm>
+          <a:prstGeom prst="rect">
+            <a:avLst/>
+          </a:prstGeom>
+          <a:noFill/>
+        </p:spPr>
+        <p:txBody>
+          <a:bodyPr wrap="square" rtlCol="0">
+            <a:spAutoFit/>
+          </a:bodyPr>
+          <a:lstStyle/>
+          <a:p>
+            <a:r>
+              <a:rPr lang="hu-HU" dirty="0" smtClean="0"/>
+              <a:t>Repository</a:t>
+            </a:r>
+            <a:endParaRPr lang="en-US" dirty="0"/>
+          </a:p>
+        </p:txBody>
+      </p:sp>
+      <p:sp>
+        <p:nvSpPr>
+          <p:cNvPr id="17" name="Rectangle 16"/>
+          <p:cNvSpPr/>
+          <p:nvPr/>
+        </p:nvSpPr>
+        <p:spPr>
+          <a:xfrm>
+            <a:off x="4214056" y="6753200"/>
+            <a:ext cx="1951248" cy="360040"/>
+          </a:xfrm>
+          <a:prstGeom prst="rect">
+            <a:avLst/>
+          </a:prstGeom>
+          <a:noFill/>
+          <a:ln>
+            <a:solidFill>
+              <a:srgbClr val="FF0000"/>
+            </a:solidFill>
+          </a:ln>
+        </p:spPr>
+        <p:style>
+          <a:lnRef idx="2">
+            <a:schemeClr val="dk1"/>
+          </a:lnRef>
+          <a:fillRef idx="1">
+            <a:schemeClr val="lt1"/>
+          </a:fillRef>
+          <a:effectRef idx="0">
+            <a:schemeClr val="dk1"/>
+          </a:effectRef>
+          <a:fontRef idx="minor">
+            <a:schemeClr val="dk1"/>
+          </a:fontRef>
+        </p:style>
+        <p:txBody>
+          <a:bodyPr rtlCol="0" anchor="ctr"/>
+          <a:lstStyle/>
+          <a:p>
+            <a:pPr algn="ctr"/>
+            <a:endParaRPr lang="en-US"/>
+          </a:p>
+        </p:txBody>
+      </p:sp>
+      <p:sp>
+        <p:nvSpPr>
+          <p:cNvPr id="18" name="Rectangle 17"/>
+          <p:cNvSpPr/>
+          <p:nvPr/>
+        </p:nvSpPr>
+        <p:spPr>
+          <a:xfrm>
+            <a:off x="2128850" y="8115611"/>
+            <a:ext cx="1516174" cy="293773"/>
+          </a:xfrm>
+          <a:prstGeom prst="rect">
+            <a:avLst/>
+          </a:prstGeom>
+          <a:noFill/>
+          <a:ln>
+            <a:solidFill>
+              <a:srgbClr val="FF0000"/>
+            </a:solidFill>
+          </a:ln>
+        </p:spPr>
+        <p:style>
+          <a:lnRef idx="2">
+            <a:schemeClr val="dk1"/>
+          </a:lnRef>
+          <a:fillRef idx="1">
+            <a:schemeClr val="lt1"/>
+          </a:fillRef>
+          <a:effectRef idx="0">
+            <a:schemeClr val="dk1"/>
+          </a:effectRef>
+          <a:fontRef idx="minor">
+            <a:schemeClr val="dk1"/>
+          </a:fontRef>
+        </p:style>
+        <p:txBody>
+          <a:bodyPr rtlCol="0" anchor="ctr"/>
+          <a:lstStyle/>
+          <a:p>
+            <a:pPr algn="ctr"/>
+            <a:endParaRPr lang="en-US"/>
+          </a:p>
+        </p:txBody>
+      </p:sp>
+      <p:sp>
+        <p:nvSpPr>
+          <p:cNvPr id="19" name="Up-Down Arrow 18"/>
+          <p:cNvSpPr/>
+          <p:nvPr/>
+        </p:nvSpPr>
+        <p:spPr>
+          <a:xfrm rot="5400000">
+            <a:off x="3010090" y="4971331"/>
+            <a:ext cx="225350" cy="2130006"/>
+          </a:xfrm>
+          <a:prstGeom prst="upDownArrow">
+            <a:avLst/>
+          </a:prstGeom>
+        </p:spPr>
+        <p:style>
+          <a:lnRef idx="1">
+            <a:schemeClr val="accent3"/>
+          </a:lnRef>
+          <a:fillRef idx="3">
+            <a:schemeClr val="accent3"/>
+          </a:fillRef>
+          <a:effectRef idx="2">
+            <a:schemeClr val="accent3"/>
+          </a:effectRef>
+          <a:fontRef idx="minor">
+            <a:schemeClr val="lt1"/>
+          </a:fontRef>
+        </p:style>
+        <p:txBody>
+          <a:bodyPr rtlCol="0" anchor="ctr"/>
+          <a:lstStyle/>
+          <a:p>
+            <a:pPr algn="ctr"/>
+            <a:endParaRPr lang="en-US"/>
+          </a:p>
+        </p:txBody>
+      </p:sp>
+      <p:sp>
+        <p:nvSpPr>
+          <p:cNvPr id="20" name="Up-Down Arrow 19"/>
+          <p:cNvSpPr/>
+          <p:nvPr/>
+        </p:nvSpPr>
+        <p:spPr>
+          <a:xfrm rot="5400000">
+            <a:off x="3424369" y="5828822"/>
+            <a:ext cx="225350" cy="1354025"/>
+          </a:xfrm>
+          <a:prstGeom prst="upDownArrow">
+            <a:avLst/>
+          </a:prstGeom>
+        </p:spPr>
+        <p:style>
+          <a:lnRef idx="1">
+            <a:schemeClr val="accent3"/>
+          </a:lnRef>
+          <a:fillRef idx="3">
+            <a:schemeClr val="accent3"/>
+          </a:fillRef>
+          <a:effectRef idx="2">
+            <a:schemeClr val="accent3"/>
+          </a:effectRef>
+          <a:fontRef idx="minor">
+            <a:schemeClr val="lt1"/>
+          </a:fontRef>
+        </p:style>
+        <p:txBody>
+          <a:bodyPr rtlCol="0" anchor="ctr"/>
+          <a:lstStyle/>
+          <a:p>
+            <a:pPr algn="ctr"/>
+            <a:endParaRPr lang="en-US"/>
+          </a:p>
+        </p:txBody>
+      </p:sp>
+      <p:sp>
+        <p:nvSpPr>
+          <p:cNvPr id="21" name="Up-Down Arrow 20"/>
+          <p:cNvSpPr/>
+          <p:nvPr/>
+        </p:nvSpPr>
+        <p:spPr>
+          <a:xfrm rot="5400000">
+            <a:off x="3774583" y="6672135"/>
+            <a:ext cx="225350" cy="613390"/>
+          </a:xfrm>
+          <a:prstGeom prst="upDownArrow">
+            <a:avLst/>
+          </a:prstGeom>
+        </p:spPr>
+        <p:style>
+          <a:lnRef idx="1">
+            <a:schemeClr val="accent3"/>
+          </a:lnRef>
+          <a:fillRef idx="3">
+            <a:schemeClr val="accent3"/>
+          </a:fillRef>
+          <a:effectRef idx="2">
+            <a:schemeClr val="accent3"/>
+          </a:effectRef>
+          <a:fontRef idx="minor">
+            <a:schemeClr val="lt1"/>
+          </a:fontRef>
+        </p:style>
+        <p:txBody>
+          <a:bodyPr rtlCol="0" anchor="ctr"/>
+          <a:lstStyle/>
+          <a:p>
+            <a:pPr algn="ctr"/>
+            <a:endParaRPr lang="en-US"/>
+          </a:p>
+        </p:txBody>
+      </p:sp>
+      <p:sp>
+        <p:nvSpPr>
+          <p:cNvPr id="23" name="Right Arrow 22"/>
+          <p:cNvSpPr/>
+          <p:nvPr/>
+        </p:nvSpPr>
+        <p:spPr>
+          <a:xfrm rot="2852745">
+            <a:off x="3466140" y="7204660"/>
+            <a:ext cx="357767" cy="216024"/>
+          </a:xfrm>
+          <a:prstGeom prst="rightArrow">
+            <a:avLst/>
+          </a:prstGeom>
+        </p:spPr>
+        <p:style>
+          <a:lnRef idx="1">
+            <a:schemeClr val="accent3"/>
+          </a:lnRef>
+          <a:fillRef idx="3">
+            <a:schemeClr val="accent3"/>
+          </a:fillRef>
+          <a:effectRef idx="2">
+            <a:schemeClr val="accent3"/>
+          </a:effectRef>
+          <a:fontRef idx="minor">
+            <a:schemeClr val="lt1"/>
+          </a:fontRef>
+        </p:style>
+        <p:txBody>
+          <a:bodyPr rtlCol="0" anchor="ctr"/>
+          <a:lstStyle/>
+          <a:p>
+            <a:pPr algn="ctr"/>
+            <a:endParaRPr lang="en-US"/>
+          </a:p>
+        </p:txBody>
+      </p:sp>
+      <p:sp>
+        <p:nvSpPr>
+          <p:cNvPr id="25" name="Right Arrow 24"/>
+          <p:cNvSpPr/>
+          <p:nvPr/>
+        </p:nvSpPr>
+        <p:spPr>
+          <a:xfrm rot="17587828" flipH="1">
+            <a:off x="3499519" y="7871076"/>
+            <a:ext cx="381349" cy="216024"/>
+          </a:xfrm>
+          <a:prstGeom prst="rightArrow">
+            <a:avLst/>
+          </a:prstGeom>
+        </p:spPr>
+        <p:style>
+          <a:lnRef idx="1">
+            <a:schemeClr val="accent3"/>
+          </a:lnRef>
+          <a:fillRef idx="3">
+            <a:schemeClr val="accent3"/>
+          </a:fillRef>
+          <a:effectRef idx="2">
+            <a:schemeClr val="accent3"/>
+          </a:effectRef>
+          <a:fontRef idx="minor">
+            <a:schemeClr val="lt1"/>
+          </a:fontRef>
+        </p:style>
+        <p:txBody>
+          <a:bodyPr rtlCol="0" anchor="ctr"/>
+          <a:lstStyle/>
+          <a:p>
+            <a:pPr algn="ctr"/>
+            <a:endParaRPr lang="en-US"/>
+          </a:p>
+        </p:txBody>
+      </p:sp>
+    </p:spTree>
+    <p:extLst>
+      <p:ext uri="{BB962C8B-B14F-4D97-AF65-F5344CB8AC3E}">
+        <p14:creationId xmlns:p14="http://schemas.microsoft.com/office/powerpoint/2010/main" val="3731438002"/>
       </p:ext>
     </p:extLst>
   </p:cSld>

</xml_diff>